<commit_message>
Revision before Cam-Ready submission
</commit_message>
<xml_diff>
--- a/img/FSM-Initial.pptx
+++ b/img/FSM-Initial.pptx
@@ -243,7 +243,7 @@
           <a:p>
             <a:fld id="{7C30EC8E-E0C2-4688-8A21-31FBB5C9B8D6}" type="datetimeFigureOut">
               <a:rPr lang="en-GB" smtClean="0"/>
-              <a:t>11/07/2022</a:t>
+              <a:t>01/09/2022</a:t>
             </a:fld>
             <a:endParaRPr lang="en-GB"/>
           </a:p>
@@ -413,7 +413,7 @@
           <a:p>
             <a:fld id="{7C30EC8E-E0C2-4688-8A21-31FBB5C9B8D6}" type="datetimeFigureOut">
               <a:rPr lang="en-GB" smtClean="0"/>
-              <a:t>11/07/2022</a:t>
+              <a:t>01/09/2022</a:t>
             </a:fld>
             <a:endParaRPr lang="en-GB"/>
           </a:p>
@@ -593,7 +593,7 @@
           <a:p>
             <a:fld id="{7C30EC8E-E0C2-4688-8A21-31FBB5C9B8D6}" type="datetimeFigureOut">
               <a:rPr lang="en-GB" smtClean="0"/>
-              <a:t>11/07/2022</a:t>
+              <a:t>01/09/2022</a:t>
             </a:fld>
             <a:endParaRPr lang="en-GB"/>
           </a:p>
@@ -763,7 +763,7 @@
           <a:p>
             <a:fld id="{7C30EC8E-E0C2-4688-8A21-31FBB5C9B8D6}" type="datetimeFigureOut">
               <a:rPr lang="en-GB" smtClean="0"/>
-              <a:t>11/07/2022</a:t>
+              <a:t>01/09/2022</a:t>
             </a:fld>
             <a:endParaRPr lang="en-GB"/>
           </a:p>
@@ -1009,7 +1009,7 @@
           <a:p>
             <a:fld id="{7C30EC8E-E0C2-4688-8A21-31FBB5C9B8D6}" type="datetimeFigureOut">
               <a:rPr lang="en-GB" smtClean="0"/>
-              <a:t>11/07/2022</a:t>
+              <a:t>01/09/2022</a:t>
             </a:fld>
             <a:endParaRPr lang="en-GB"/>
           </a:p>
@@ -1241,7 +1241,7 @@
           <a:p>
             <a:fld id="{7C30EC8E-E0C2-4688-8A21-31FBB5C9B8D6}" type="datetimeFigureOut">
               <a:rPr lang="en-GB" smtClean="0"/>
-              <a:t>11/07/2022</a:t>
+              <a:t>01/09/2022</a:t>
             </a:fld>
             <a:endParaRPr lang="en-GB"/>
           </a:p>
@@ -1608,7 +1608,7 @@
           <a:p>
             <a:fld id="{7C30EC8E-E0C2-4688-8A21-31FBB5C9B8D6}" type="datetimeFigureOut">
               <a:rPr lang="en-GB" smtClean="0"/>
-              <a:t>11/07/2022</a:t>
+              <a:t>01/09/2022</a:t>
             </a:fld>
             <a:endParaRPr lang="en-GB"/>
           </a:p>
@@ -1726,7 +1726,7 @@
           <a:p>
             <a:fld id="{7C30EC8E-E0C2-4688-8A21-31FBB5C9B8D6}" type="datetimeFigureOut">
               <a:rPr lang="en-GB" smtClean="0"/>
-              <a:t>11/07/2022</a:t>
+              <a:t>01/09/2022</a:t>
             </a:fld>
             <a:endParaRPr lang="en-GB"/>
           </a:p>
@@ -1821,7 +1821,7 @@
           <a:p>
             <a:fld id="{7C30EC8E-E0C2-4688-8A21-31FBB5C9B8D6}" type="datetimeFigureOut">
               <a:rPr lang="en-GB" smtClean="0"/>
-              <a:t>11/07/2022</a:t>
+              <a:t>01/09/2022</a:t>
             </a:fld>
             <a:endParaRPr lang="en-GB"/>
           </a:p>
@@ -2098,7 +2098,7 @@
           <a:p>
             <a:fld id="{7C30EC8E-E0C2-4688-8A21-31FBB5C9B8D6}" type="datetimeFigureOut">
               <a:rPr lang="en-GB" smtClean="0"/>
-              <a:t>11/07/2022</a:t>
+              <a:t>01/09/2022</a:t>
             </a:fld>
             <a:endParaRPr lang="en-GB"/>
           </a:p>
@@ -2351,7 +2351,7 @@
           <a:p>
             <a:fld id="{7C30EC8E-E0C2-4688-8A21-31FBB5C9B8D6}" type="datetimeFigureOut">
               <a:rPr lang="en-GB" smtClean="0"/>
-              <a:t>11/07/2022</a:t>
+              <a:t>01/09/2022</a:t>
             </a:fld>
             <a:endParaRPr lang="en-GB"/>
           </a:p>
@@ -2564,7 +2564,7 @@
           <a:p>
             <a:fld id="{7C30EC8E-E0C2-4688-8A21-31FBB5C9B8D6}" type="datetimeFigureOut">
               <a:rPr lang="en-GB" smtClean="0"/>
-              <a:t>11/07/2022</a:t>
+              <a:t>01/09/2022</a:t>
             </a:fld>
             <a:endParaRPr lang="en-GB"/>
           </a:p>
@@ -2997,11 +2997,7 @@
             <a:prstGeom prst="rect">
               <a:avLst/>
             </a:prstGeom>
-            <a:solidFill>
-              <a:schemeClr val="bg2">
-                <a:lumMod val="90000"/>
-              </a:schemeClr>
-            </a:solidFill>
+            <a:noFill/>
           </p:spPr>
           <p:style>
             <a:lnRef idx="2">
@@ -3628,11 +3624,7 @@
             <a:prstGeom prst="rect">
               <a:avLst/>
             </a:prstGeom>
-            <a:solidFill>
-              <a:schemeClr val="bg2">
-                <a:lumMod val="90000"/>
-              </a:schemeClr>
-            </a:solidFill>
+            <a:noFill/>
           </p:spPr>
           <p:style>
             <a:lnRef idx="2">
@@ -4509,11 +4501,7 @@
             <a:prstGeom prst="rect">
               <a:avLst/>
             </a:prstGeom>
-            <a:solidFill>
-              <a:schemeClr val="bg2">
-                <a:lumMod val="90000"/>
-              </a:schemeClr>
-            </a:solidFill>
+            <a:noFill/>
           </p:spPr>
           <p:style>
             <a:lnRef idx="2">

</xml_diff>